<commit_message>
atualizado arquivos para Sprint 2
</commit_message>
<xml_diff>
--- a/Documentação/Caso_de_uso_Dashboard.pptx
+++ b/Documentação/Caso_de_uso_Dashboard.pptx
@@ -2,10 +2,10 @@
 <file path=ppt/presentation.xml><?xml version="1.0" encoding="utf-8"?>
 <p:presentation xmlns:a="http://schemas.openxmlformats.org/drawingml/2006/main" xmlns:r="http://schemas.openxmlformats.org/officeDocument/2006/relationships" xmlns:p="http://schemas.openxmlformats.org/presentationml/2006/main" saveSubsetFonts="1">
   <p:sldMasterIdLst>
-    <p:sldMasterId id="2147483648" r:id="rId1"/>
+    <p:sldMasterId id="2147483648" r:id="rId4"/>
   </p:sldMasterIdLst>
   <p:sldIdLst>
-    <p:sldId id="256" r:id="rId2"/>
+    <p:sldId id="256" r:id="rId5"/>
   </p:sldIdLst>
   <p:sldSz cx="12192000" cy="6858000"/>
   <p:notesSz cx="6858000" cy="9144000"/>
@@ -104,6 +104,11 @@
       </a:defRPr>
     </a:lvl9pPr>
   </p:defaultTextStyle>
+  <p:extLst>
+    <p:ext uri="{EFAFB233-063F-42B5-8137-9DF3F51BA10A}">
+      <p15:sldGuideLst xmlns:p15="http://schemas.microsoft.com/office/powerpoint/2012/main"/>
+    </p:ext>
+  </p:extLst>
 </p:presentation>
 </file>
 
@@ -238,7 +243,7 @@
           <a:p>
             <a:fld id="{5A27CA55-FB04-41AE-8CF2-F9DC46D86FA6}" type="datetimeFigureOut">
               <a:rPr lang="en-US" smtClean="0"/>
-              <a:t>10/2/2019</a:t>
+              <a:t>10/18/2019</a:t>
             </a:fld>
             <a:endParaRPr lang="en-US"/>
           </a:p>
@@ -408,7 +413,7 @@
           <a:p>
             <a:fld id="{5A27CA55-FB04-41AE-8CF2-F9DC46D86FA6}" type="datetimeFigureOut">
               <a:rPr lang="en-US" smtClean="0"/>
-              <a:t>10/2/2019</a:t>
+              <a:t>10/18/2019</a:t>
             </a:fld>
             <a:endParaRPr lang="en-US"/>
           </a:p>
@@ -588,7 +593,7 @@
           <a:p>
             <a:fld id="{5A27CA55-FB04-41AE-8CF2-F9DC46D86FA6}" type="datetimeFigureOut">
               <a:rPr lang="en-US" smtClean="0"/>
-              <a:t>10/2/2019</a:t>
+              <a:t>10/18/2019</a:t>
             </a:fld>
             <a:endParaRPr lang="en-US"/>
           </a:p>
@@ -758,7 +763,7 @@
           <a:p>
             <a:fld id="{5A27CA55-FB04-41AE-8CF2-F9DC46D86FA6}" type="datetimeFigureOut">
               <a:rPr lang="en-US" smtClean="0"/>
-              <a:t>10/2/2019</a:t>
+              <a:t>10/18/2019</a:t>
             </a:fld>
             <a:endParaRPr lang="en-US"/>
           </a:p>
@@ -1004,7 +1009,7 @@
           <a:p>
             <a:fld id="{5A27CA55-FB04-41AE-8CF2-F9DC46D86FA6}" type="datetimeFigureOut">
               <a:rPr lang="en-US" smtClean="0"/>
-              <a:t>10/2/2019</a:t>
+              <a:t>10/18/2019</a:t>
             </a:fld>
             <a:endParaRPr lang="en-US"/>
           </a:p>
@@ -1236,7 +1241,7 @@
           <a:p>
             <a:fld id="{5A27CA55-FB04-41AE-8CF2-F9DC46D86FA6}" type="datetimeFigureOut">
               <a:rPr lang="en-US" smtClean="0"/>
-              <a:t>10/2/2019</a:t>
+              <a:t>10/18/2019</a:t>
             </a:fld>
             <a:endParaRPr lang="en-US"/>
           </a:p>
@@ -1603,7 +1608,7 @@
           <a:p>
             <a:fld id="{5A27CA55-FB04-41AE-8CF2-F9DC46D86FA6}" type="datetimeFigureOut">
               <a:rPr lang="en-US" smtClean="0"/>
-              <a:t>10/2/2019</a:t>
+              <a:t>10/18/2019</a:t>
             </a:fld>
             <a:endParaRPr lang="en-US"/>
           </a:p>
@@ -1721,7 +1726,7 @@
           <a:p>
             <a:fld id="{5A27CA55-FB04-41AE-8CF2-F9DC46D86FA6}" type="datetimeFigureOut">
               <a:rPr lang="en-US" smtClean="0"/>
-              <a:t>10/2/2019</a:t>
+              <a:t>10/18/2019</a:t>
             </a:fld>
             <a:endParaRPr lang="en-US"/>
           </a:p>
@@ -1816,7 +1821,7 @@
           <a:p>
             <a:fld id="{5A27CA55-FB04-41AE-8CF2-F9DC46D86FA6}" type="datetimeFigureOut">
               <a:rPr lang="en-US" smtClean="0"/>
-              <a:t>10/2/2019</a:t>
+              <a:t>10/18/2019</a:t>
             </a:fld>
             <a:endParaRPr lang="en-US"/>
           </a:p>
@@ -2093,7 +2098,7 @@
           <a:p>
             <a:fld id="{5A27CA55-FB04-41AE-8CF2-F9DC46D86FA6}" type="datetimeFigureOut">
               <a:rPr lang="en-US" smtClean="0"/>
-              <a:t>10/2/2019</a:t>
+              <a:t>10/18/2019</a:t>
             </a:fld>
             <a:endParaRPr lang="en-US"/>
           </a:p>
@@ -2346,7 +2351,7 @@
           <a:p>
             <a:fld id="{5A27CA55-FB04-41AE-8CF2-F9DC46D86FA6}" type="datetimeFigureOut">
               <a:rPr lang="en-US" smtClean="0"/>
-              <a:t>10/2/2019</a:t>
+              <a:t>10/18/2019</a:t>
             </a:fld>
             <a:endParaRPr lang="en-US"/>
           </a:p>
@@ -2559,7 +2564,7 @@
           <a:p>
             <a:fld id="{5A27CA55-FB04-41AE-8CF2-F9DC46D86FA6}" type="datetimeFigureOut">
               <a:rPr lang="en-US" smtClean="0"/>
-              <a:t>10/2/2019</a:t>
+              <a:t>10/18/2019</a:t>
             </a:fld>
             <a:endParaRPr lang="en-US"/>
           </a:p>
@@ -4029,7 +4034,11 @@
           <a:p>
             <a:r>
               <a:rPr lang="pt-BR" dirty="0" smtClean="0"/>
-              <a:t>Visualiza gráficos e Tabelas</a:t>
+              <a:t>Visualizar gráficos </a:t>
+            </a:r>
+            <a:r>
+              <a:rPr lang="pt-BR" dirty="0" smtClean="0"/>
+              <a:t>e Tabelas</a:t>
             </a:r>
             <a:endParaRPr lang="en-US" dirty="0"/>
           </a:p>
@@ -4059,7 +4068,11 @@
           <a:p>
             <a:r>
               <a:rPr lang="pt-BR" dirty="0" smtClean="0"/>
-              <a:t>Seleciona período</a:t>
+              <a:t>Selecionar </a:t>
+            </a:r>
+            <a:r>
+              <a:rPr lang="pt-BR" dirty="0" smtClean="0"/>
+              <a:t>período</a:t>
             </a:r>
             <a:endParaRPr lang="en-US" dirty="0"/>
           </a:p>
@@ -4089,7 +4102,13 @@
           <a:p>
             <a:r>
               <a:rPr lang="pt-BR" dirty="0" smtClean="0"/>
-              <a:t>Gera relatórios</a:t>
+              <a:t>Gerar</a:t>
+            </a:r>
+          </a:p>
+          <a:p>
+            <a:r>
+              <a:rPr lang="pt-BR" dirty="0" smtClean="0"/>
+              <a:t>relatórios</a:t>
             </a:r>
             <a:endParaRPr lang="en-US" dirty="0"/>
           </a:p>
@@ -4149,7 +4168,19 @@
           <a:p>
             <a:r>
               <a:rPr lang="pt-BR" dirty="0" smtClean="0"/>
-              <a:t>Visualiza equipes de todos gestores</a:t>
+              <a:t>Visualizar </a:t>
+            </a:r>
+            <a:r>
+              <a:rPr lang="pt-BR" dirty="0" smtClean="0"/>
+              <a:t>equipes </a:t>
+            </a:r>
+            <a:r>
+              <a:rPr lang="pt-BR" dirty="0" smtClean="0"/>
+              <a:t>de todos </a:t>
+            </a:r>
+            <a:r>
+              <a:rPr lang="pt-BR" dirty="0" smtClean="0"/>
+              <a:t>gestores</a:t>
             </a:r>
           </a:p>
           <a:p>
@@ -4195,7 +4226,7 @@
         </p:nvSpPr>
         <p:spPr>
           <a:xfrm>
-            <a:off x="1532722" y="6086296"/>
+            <a:off x="1680186" y="5896885"/>
             <a:ext cx="1499764" cy="378822"/>
           </a:xfrm>
           <a:prstGeom prst="rect">
@@ -4211,7 +4242,7 @@
           <a:p>
             <a:r>
               <a:rPr lang="pt-BR" dirty="0" smtClean="0"/>
-              <a:t>Sócio/CEO</a:t>
+              <a:t>Gerente</a:t>
             </a:r>
             <a:endParaRPr lang="en-US" dirty="0"/>
           </a:p>
@@ -4266,7 +4297,7 @@
         </p:nvSpPr>
         <p:spPr>
           <a:xfrm>
-            <a:off x="7758045" y="4576362"/>
+            <a:off x="7771108" y="4576362"/>
             <a:ext cx="1423852" cy="646331"/>
           </a:xfrm>
           <a:prstGeom prst="rect">
@@ -4282,7 +4313,11 @@
           <a:p>
             <a:r>
               <a:rPr lang="pt-BR" dirty="0" smtClean="0"/>
-              <a:t>Selecionar equipe</a:t>
+              <a:t>Selecionar </a:t>
+            </a:r>
+            <a:r>
+              <a:rPr lang="pt-BR" dirty="0" smtClean="0"/>
+              <a:t>equipe</a:t>
             </a:r>
             <a:endParaRPr lang="en-US" dirty="0"/>
           </a:p>
@@ -4797,6 +4832,12 @@
 </file>
 
 <file path=customXml/item2.xml><?xml version="1.0" encoding="utf-8"?>
+<p:properties xmlns:p="http://schemas.microsoft.com/office/2006/metadata/properties" xmlns:xsi="http://www.w3.org/2001/XMLSchema-instance" xmlns:pc="http://schemas.microsoft.com/office/infopath/2007/PartnerControls">
+  <documentManagement/>
+</p:properties>
+</file>
+
+<file path=customXml/item3.xml><?xml version="1.0" encoding="utf-8"?>
 <?mso-contentType ?>
 <FormTemplates xmlns="http://schemas.microsoft.com/sharepoint/v3/contenttype/forms">
   <Display>DocumentLibraryForm</Display>
@@ -4805,20 +4846,37 @@
 </FormTemplates>
 </file>
 
-<file path=customXml/item3.xml><?xml version="1.0" encoding="utf-8"?>
-<p:properties xmlns:p="http://schemas.microsoft.com/office/2006/metadata/properties" xmlns:xsi="http://www.w3.org/2001/XMLSchema-instance" xmlns:pc="http://schemas.microsoft.com/office/infopath/2007/PartnerControls">
-  <documentManagement/>
-</p:properties>
-</file>
-
 <file path=customXml/itemProps1.xml><?xml version="1.0" encoding="utf-8"?>
-<ds:datastoreItem xmlns:ds="http://schemas.openxmlformats.org/officeDocument/2006/customXml" ds:itemID="{FD607DD4-FDFA-40A3-80E0-3BFA586B6237}"/>
+<ds:datastoreItem xmlns:ds="http://schemas.openxmlformats.org/officeDocument/2006/customXml" ds:itemID="{FD607DD4-FDFA-40A3-80E0-3BFA586B6237}">
+  <ds:schemaRefs>
+    <ds:schemaRef ds:uri="http://schemas.microsoft.com/office/2006/metadata/contentType"/>
+    <ds:schemaRef ds:uri="http://schemas.microsoft.com/office/2006/metadata/properties/metaAttributes"/>
+    <ds:schemaRef ds:uri="http://www.w3.org/2001/XMLSchema"/>
+    <ds:schemaRef ds:uri="http://schemas.microsoft.com/office/2006/metadata/properties"/>
+    <ds:schemaRef ds:uri="be2b4223-36fe-405e-863b-49c6636b162e"/>
+    <ds:schemaRef ds:uri="http://schemas.microsoft.com/office/2006/documentManagement/types"/>
+    <ds:schemaRef ds:uri="http://schemas.microsoft.com/office/infopath/2007/PartnerControls"/>
+    <ds:schemaRef ds:uri="http://schemas.openxmlformats.org/package/2006/metadata/core-properties"/>
+    <ds:schemaRef ds:uri="http://purl.org/dc/elements/1.1/"/>
+    <ds:schemaRef ds:uri="http://purl.org/dc/terms/"/>
+    <ds:schemaRef ds:uri="http://schemas.microsoft.com/internal/obd"/>
+  </ds:schemaRefs>
+</ds:datastoreItem>
 </file>
 
 <file path=customXml/itemProps2.xml><?xml version="1.0" encoding="utf-8"?>
-<ds:datastoreItem xmlns:ds="http://schemas.openxmlformats.org/officeDocument/2006/customXml" ds:itemID="{0AF1DED9-B296-4102-B2E7-6FC83118FF5F}"/>
+<ds:datastoreItem xmlns:ds="http://schemas.openxmlformats.org/officeDocument/2006/customXml" ds:itemID="{201DCA8B-206E-419D-80BC-8E9AC51C4E6C}">
+  <ds:schemaRefs>
+    <ds:schemaRef ds:uri="http://schemas.microsoft.com/office/2006/metadata/properties"/>
+    <ds:schemaRef ds:uri="http://schemas.microsoft.com/office/infopath/2007/PartnerControls"/>
+  </ds:schemaRefs>
+</ds:datastoreItem>
 </file>
 
 <file path=customXml/itemProps3.xml><?xml version="1.0" encoding="utf-8"?>
-<ds:datastoreItem xmlns:ds="http://schemas.openxmlformats.org/officeDocument/2006/customXml" ds:itemID="{201DCA8B-206E-419D-80BC-8E9AC51C4E6C}"/>
+<ds:datastoreItem xmlns:ds="http://schemas.openxmlformats.org/officeDocument/2006/customXml" ds:itemID="{0AF1DED9-B296-4102-B2E7-6FC83118FF5F}">
+  <ds:schemaRefs>
+    <ds:schemaRef ds:uri="http://schemas.microsoft.com/sharepoint/v3/contenttype/forms"/>
+  </ds:schemaRefs>
+</ds:datastoreItem>
 </file>
</xml_diff>